<commit_message>
Friday week 10 commit
:)
</commit_message>
<xml_diff>
--- a/Final project/Data_Science_1_Final_Presentation_Phileas_Dazeley_Gaist.pptx
+++ b/Final project/Data_Science_1_Final_Presentation_Phileas_Dazeley_Gaist.pptx
@@ -5972,7 +5972,7 @@
           <a:p>
             <a:fld id="{3C66F4BC-3750-4950-A18E-4CA6A14B3CE9}" type="datetimeFigureOut">
               <a:rPr lang="en-US" smtClean="0"/>
-              <a:t>11/16/2021</a:t>
+              <a:t>11/19/2021</a:t>
             </a:fld>
             <a:endParaRPr lang="en-US"/>
           </a:p>
@@ -7857,7 +7857,7 @@
           <a:p>
             <a:fld id="{9D0C9DD5-5BB3-4CDA-8787-C77602C03845}" type="datetimeFigureOut">
               <a:rPr lang="en-US" smtClean="0"/>
-              <a:t>11/16/2021</a:t>
+              <a:t>11/19/2021</a:t>
             </a:fld>
             <a:endParaRPr lang="en-US"/>
           </a:p>
@@ -8027,7 +8027,7 @@
           <a:p>
             <a:fld id="{9D0C9DD5-5BB3-4CDA-8787-C77602C03845}" type="datetimeFigureOut">
               <a:rPr lang="en-US" smtClean="0"/>
-              <a:t>11/16/2021</a:t>
+              <a:t>11/19/2021</a:t>
             </a:fld>
             <a:endParaRPr lang="en-US"/>
           </a:p>
@@ -8207,7 +8207,7 @@
           <a:p>
             <a:fld id="{9D0C9DD5-5BB3-4CDA-8787-C77602C03845}" type="datetimeFigureOut">
               <a:rPr lang="en-US" smtClean="0"/>
-              <a:t>11/16/2021</a:t>
+              <a:t>11/19/2021</a:t>
             </a:fld>
             <a:endParaRPr lang="en-US"/>
           </a:p>
@@ -8377,7 +8377,7 @@
           <a:p>
             <a:fld id="{9D0C9DD5-5BB3-4CDA-8787-C77602C03845}" type="datetimeFigureOut">
               <a:rPr lang="en-US" smtClean="0"/>
-              <a:t>11/16/2021</a:t>
+              <a:t>11/19/2021</a:t>
             </a:fld>
             <a:endParaRPr lang="en-US"/>
           </a:p>
@@ -8623,7 +8623,7 @@
           <a:p>
             <a:fld id="{9D0C9DD5-5BB3-4CDA-8787-C77602C03845}" type="datetimeFigureOut">
               <a:rPr lang="en-US" smtClean="0"/>
-              <a:t>11/16/2021</a:t>
+              <a:t>11/19/2021</a:t>
             </a:fld>
             <a:endParaRPr lang="en-US"/>
           </a:p>
@@ -8855,7 +8855,7 @@
           <a:p>
             <a:fld id="{9D0C9DD5-5BB3-4CDA-8787-C77602C03845}" type="datetimeFigureOut">
               <a:rPr lang="en-US" smtClean="0"/>
-              <a:t>11/16/2021</a:t>
+              <a:t>11/19/2021</a:t>
             </a:fld>
             <a:endParaRPr lang="en-US"/>
           </a:p>
@@ -9222,7 +9222,7 @@
           <a:p>
             <a:fld id="{9D0C9DD5-5BB3-4CDA-8787-C77602C03845}" type="datetimeFigureOut">
               <a:rPr lang="en-US" smtClean="0"/>
-              <a:t>11/16/2021</a:t>
+              <a:t>11/19/2021</a:t>
             </a:fld>
             <a:endParaRPr lang="en-US"/>
           </a:p>
@@ -9340,7 +9340,7 @@
           <a:p>
             <a:fld id="{9D0C9DD5-5BB3-4CDA-8787-C77602C03845}" type="datetimeFigureOut">
               <a:rPr lang="en-US" smtClean="0"/>
-              <a:t>11/16/2021</a:t>
+              <a:t>11/19/2021</a:t>
             </a:fld>
             <a:endParaRPr lang="en-US"/>
           </a:p>
@@ -9435,7 +9435,7 @@
           <a:p>
             <a:fld id="{9D0C9DD5-5BB3-4CDA-8787-C77602C03845}" type="datetimeFigureOut">
               <a:rPr lang="en-US" smtClean="0"/>
-              <a:t>11/16/2021</a:t>
+              <a:t>11/19/2021</a:t>
             </a:fld>
             <a:endParaRPr lang="en-US"/>
           </a:p>
@@ -9712,7 +9712,7 @@
           <a:p>
             <a:fld id="{9D0C9DD5-5BB3-4CDA-8787-C77602C03845}" type="datetimeFigureOut">
               <a:rPr lang="en-US" smtClean="0"/>
-              <a:t>11/16/2021</a:t>
+              <a:t>11/19/2021</a:t>
             </a:fld>
             <a:endParaRPr lang="en-US"/>
           </a:p>
@@ -9969,7 +9969,7 @@
           <a:p>
             <a:fld id="{9D0C9DD5-5BB3-4CDA-8787-C77602C03845}" type="datetimeFigureOut">
               <a:rPr lang="en-US" smtClean="0"/>
-              <a:t>11/16/2021</a:t>
+              <a:t>11/19/2021</a:t>
             </a:fld>
             <a:endParaRPr lang="en-US"/>
           </a:p>
@@ -10182,7 +10182,7 @@
           <a:p>
             <a:fld id="{9D0C9DD5-5BB3-4CDA-8787-C77602C03845}" type="datetimeFigureOut">
               <a:rPr lang="en-US" smtClean="0"/>
-              <a:t>11/16/2021</a:t>
+              <a:t>11/19/2021</a:t>
             </a:fld>
             <a:endParaRPr lang="en-US"/>
           </a:p>
@@ -11172,13 +11172,13 @@
           <a:lstStyle/>
           <a:p>
             <a:pPr algn="l"/>
-            <a:endParaRPr lang="en-US"/>
+            <a:endParaRPr lang="en-US" dirty="0"/>
           </a:p>
           <a:p>
             <a:pPr algn="l"/>
             <a:r>
-              <a:rPr lang="en-US"/>
-              <a:t>Phileas Dazeley Gaist – COA Biostatistics Spring 2021</a:t>
+              <a:rPr lang="en-US" dirty="0"/>
+              <a:t>Phileas Dazeley Gaist – COA Data Science 1 – Fall 2021</a:t>
             </a:r>
           </a:p>
         </p:txBody>

</xml_diff>